<commit_message>
[MT] inserimento template presentazione
</commit_message>
<xml_diff>
--- a/Presentazione/Esempio/Presentazione CBunisa_Esempio.pptx
+++ b/Presentazione/Esempio/Presentazione CBunisa_Esempio.pptx
@@ -9516,6 +9516,64 @@
           </a:fontRef>
         </p:style>
       </p:pic>
+      <p:sp>
+        <p:nvSpPr>
+          <p:cNvPr id="4" name="CasellaDiTesto 3"/>
+          <p:cNvSpPr txBox="1"/>
+          <p:nvPr/>
+        </p:nvSpPr>
+        <p:spPr>
+          <a:xfrm>
+            <a:off x="-15776" y="5492948"/>
+            <a:ext cx="8191666" cy="830997"/>
+          </a:xfrm>
+          <a:prstGeom prst="rect">
+            <a:avLst/>
+          </a:prstGeom>
+          <a:noFill/>
+        </p:spPr>
+        <p:txBody>
+          <a:bodyPr wrap="none" rtlCol="0">
+            <a:spAutoFit/>
+          </a:bodyPr>
+          <a:lstStyle/>
+          <a:p>
+            <a:r>
+              <a:rPr lang="it-IT" dirty="0" smtClean="0"/>
+              <a:t> </a:t>
+            </a:r>
+            <a:r>
+              <a:rPr lang="it-IT" sz="2400" b="1" dirty="0" smtClean="0">
+                <a:solidFill>
+                  <a:srgbClr val="FF0000"/>
+                </a:solidFill>
+                <a:latin typeface="Arial" pitchFamily="34" charset="0"/>
+                <a:cs typeface="Arial" pitchFamily="34" charset="0"/>
+              </a:rPr>
+              <a:t>Sottolineate gli attori protagonisti della presentazione.</a:t>
+            </a:r>
+          </a:p>
+          <a:p>
+            <a:r>
+              <a:rPr lang="it-IT" sz="2400" b="1" dirty="0" smtClean="0">
+                <a:solidFill>
+                  <a:srgbClr val="FF0000"/>
+                </a:solidFill>
+                <a:latin typeface="Arial" pitchFamily="34" charset="0"/>
+                <a:cs typeface="Arial" pitchFamily="34" charset="0"/>
+              </a:rPr>
+              <a:t>Spiegate le generalizzazioni usate</a:t>
+            </a:r>
+            <a:endParaRPr lang="it-IT" sz="2400" b="1" dirty="0">
+              <a:solidFill>
+                <a:srgbClr val="FF0000"/>
+              </a:solidFill>
+              <a:latin typeface="Arial" pitchFamily="34" charset="0"/>
+              <a:cs typeface="Arial" pitchFamily="34" charset="0"/>
+            </a:endParaRPr>
+          </a:p>
+        </p:txBody>
+      </p:sp>
     </p:spTree>
   </p:cSld>
   <p:clrMapOvr>

</xml_diff>